<commit_message>
Update Success.Story- Presentation V1.pptx
</commit_message>
<xml_diff>
--- a/Downloads/Success.Story- Presentation V1.pptx
+++ b/Downloads/Success.Story- Presentation V1.pptx
@@ -9275,18 +9275,35 @@
         </p:nvSpPr>
         <p:spPr>
           <a:xfrm>
-            <a:off x="466725" y="559678"/>
-            <a:ext cx="4129181" cy="4952492"/>
+            <a:off x="175178" y="360895"/>
+            <a:ext cx="4360862" cy="2143765"/>
           </a:xfrm>
         </p:spPr>
         <p:txBody>
           <a:bodyPr/>
           <a:lstStyle/>
           <a:p>
-            <a:r>
-              <a:rPr lang="en-US"/>
-              <a:t>How to use this template</a:t>
-            </a:r>
+            <a:pPr algn="ctr"/>
+            <a:r>
+              <a:rPr lang="en-US" dirty="0">
+                <a:solidFill>
+                  <a:srgbClr val="B2129B"/>
+                </a:solidFill>
+              </a:rPr>
+              <a:t>Success Story Template </a:t>
+            </a:r>
+            <a:br>
+              <a:rPr lang="en-US" dirty="0">
+                <a:solidFill>
+                  <a:srgbClr val="B2129B"/>
+                </a:solidFill>
+              </a:rPr>
+            </a:br>
+            <a:endParaRPr lang="en-US" sz="2800" dirty="0">
+              <a:solidFill>
+                <a:srgbClr val="B2129B"/>
+              </a:solidFill>
+            </a:endParaRPr>
           </a:p>
         </p:txBody>
       </p:sp>
@@ -9372,6 +9389,67 @@
               <a:t>1</a:t>
             </a:fld>
             <a:endParaRPr lang="en-US"/>
+          </a:p>
+        </p:txBody>
+      </p:sp>
+      <p:sp>
+        <p:nvSpPr>
+          <p:cNvPr id="5" name="Title 1">
+            <a:extLst>
+              <a:ext uri="{FF2B5EF4-FFF2-40B4-BE49-F238E27FC236}">
+                <a16:creationId xmlns:a16="http://schemas.microsoft.com/office/drawing/2014/main" id="{A95E08E8-289A-4675-96ED-E66821E95374}"/>
+              </a:ext>
+            </a:extLst>
+          </p:cNvPr>
+          <p:cNvSpPr txBox="1">
+            <a:spLocks/>
+          </p:cNvSpPr>
+          <p:nvPr/>
+        </p:nvSpPr>
+        <p:spPr>
+          <a:xfrm>
+            <a:off x="762002" y="1759000"/>
+            <a:ext cx="4360862" cy="1156479"/>
+          </a:xfrm>
+          <a:prstGeom prst="rect">
+            <a:avLst/>
+          </a:prstGeom>
+        </p:spPr>
+        <p:txBody>
+          <a:bodyPr vert="horz" lIns="91440" tIns="45720" rIns="91440" bIns="45720" rtlCol="0" anchor="b">
+            <a:normAutofit lnSpcReduction="10000"/>
+          </a:bodyPr>
+          <a:lstStyle>
+            <a:lvl1pPr algn="r" defTabSz="914400" rtl="0" eaLnBrk="1" latinLnBrk="0" hangingPunct="1">
+              <a:lnSpc>
+                <a:spcPct val="90000"/>
+              </a:lnSpc>
+              <a:spcBef>
+                <a:spcPct val="0"/>
+              </a:spcBef>
+              <a:buNone/>
+              <a:defRPr sz="5000" b="0" i="1" kern="1200" baseline="0">
+                <a:solidFill>
+                  <a:schemeClr val="tx1">
+                    <a:lumMod val="85000"/>
+                    <a:lumOff val="15000"/>
+                  </a:schemeClr>
+                </a:solidFill>
+                <a:latin typeface="+mj-lt"/>
+                <a:ea typeface="+mj-ea"/>
+                <a:cs typeface="+mj-cs"/>
+              </a:defRPr>
+            </a:lvl1pPr>
+          </a:lstStyle>
+          <a:p>
+            <a:pPr algn="l"/>
+            <a:br>
+              <a:rPr lang="en-US" dirty="0"/>
+            </a:br>
+            <a:r>
+              <a:rPr lang="en-US" sz="2800" dirty="0"/>
+              <a:t>How to use this template</a:t>
+            </a:r>
           </a:p>
         </p:txBody>
       </p:sp>
@@ -11118,23 +11196,6 @@
 </file>
 
 <file path=customXml/item1.xml><?xml version="1.0" encoding="utf-8"?>
-<p:properties xmlns:p="http://schemas.microsoft.com/office/2006/metadata/properties" xmlns:xsi="http://www.w3.org/2001/XMLSchema-instance" xmlns:pc="http://schemas.microsoft.com/office/infopath/2007/PartnerControls">
-  <documentManagement>
-    <MediaServiceKeyPoints xmlns="71af3243-3dd4-4a8d-8c0d-dd76da1f02a5" xsi:nil="true"/>
-  </documentManagement>
-</p:properties>
-</file>
-
-<file path=customXml/item2.xml><?xml version="1.0" encoding="utf-8"?>
-<?mso-contentType ?>
-<FormTemplates xmlns="http://schemas.microsoft.com/sharepoint/v3/contenttype/forms">
-  <Display>DocumentLibraryForm</Display>
-  <Edit>DocumentLibraryForm</Edit>
-  <New>DocumentLibraryForm</New>
-</FormTemplates>
-</file>
-
-<file path=customXml/item3.xml><?xml version="1.0" encoding="utf-8"?>
 <ct:contentTypeSchema xmlns:ct="http://schemas.microsoft.com/office/2006/metadata/contentType" xmlns:ma="http://schemas.microsoft.com/office/2006/metadata/properties/metaAttributes" ct:_="" ma:_="" ma:contentTypeName="Document" ma:contentTypeID="0x01010079F111ED35F8CC479449609E8A0923A6" ma:contentTypeVersion="11" ma:contentTypeDescription="Create a new document." ma:contentTypeScope="" ma:versionID="1c2eb7a32e66fb6e4260f3771546a5e2">
   <xsd:schema xmlns:xsd="http://www.w3.org/2001/XMLSchema" xmlns:xs="http://www.w3.org/2001/XMLSchema" xmlns:p="http://schemas.microsoft.com/office/2006/metadata/properties" xmlns:ns2="71af3243-3dd4-4a8d-8c0d-dd76da1f02a5" xmlns:ns3="16c05727-aa75-4e4a-9b5f-8a80a1165891" targetNamespace="http://schemas.microsoft.com/office/2006/metadata/properties" ma:root="true" ma:fieldsID="04e1f6479c48b08974ba73b5ca973489" ns2:_="" ns3:_="">
     <xsd:import namespace="71af3243-3dd4-4a8d-8c0d-dd76da1f02a5"/>
@@ -11345,25 +11406,24 @@
 </ct:contentTypeSchema>
 </file>
 
-<file path=customXml/itemProps1.xml><?xml version="1.0" encoding="utf-8"?>
-<ds:datastoreItem xmlns:ds="http://schemas.openxmlformats.org/officeDocument/2006/customXml" ds:itemID="{6DB4AFBF-E012-4607-B95C-D9E661912AC6}">
-  <ds:schemaRefs>
-    <ds:schemaRef ds:uri="http://schemas.microsoft.com/office/2006/metadata/properties"/>
-    <ds:schemaRef ds:uri="http://schemas.microsoft.com/office/infopath/2007/PartnerControls"/>
-    <ds:schemaRef ds:uri="71af3243-3dd4-4a8d-8c0d-dd76da1f02a5"/>
-  </ds:schemaRefs>
-</ds:datastoreItem>
+<file path=customXml/item2.xml><?xml version="1.0" encoding="utf-8"?>
+<?mso-contentType ?>
+<FormTemplates xmlns="http://schemas.microsoft.com/sharepoint/v3/contenttype/forms">
+  <Display>DocumentLibraryForm</Display>
+  <Edit>DocumentLibraryForm</Edit>
+  <New>DocumentLibraryForm</New>
+</FormTemplates>
 </file>
 
-<file path=customXml/itemProps2.xml><?xml version="1.0" encoding="utf-8"?>
-<ds:datastoreItem xmlns:ds="http://schemas.openxmlformats.org/officeDocument/2006/customXml" ds:itemID="{C77EC923-6023-4411-8330-A0042153EED3}">
-  <ds:schemaRefs>
-    <ds:schemaRef ds:uri="http://schemas.microsoft.com/sharepoint/v3/contenttype/forms"/>
-  </ds:schemaRefs>
-</ds:datastoreItem>
+<file path=customXml/item3.xml><?xml version="1.0" encoding="utf-8"?>
+<p:properties xmlns:p="http://schemas.microsoft.com/office/2006/metadata/properties" xmlns:xsi="http://www.w3.org/2001/XMLSchema-instance" xmlns:pc="http://schemas.microsoft.com/office/infopath/2007/PartnerControls">
+  <documentManagement>
+    <MediaServiceKeyPoints xmlns="71af3243-3dd4-4a8d-8c0d-dd76da1f02a5" xsi:nil="true"/>
+  </documentManagement>
+</p:properties>
 </file>
 
-<file path=customXml/itemProps3.xml><?xml version="1.0" encoding="utf-8"?>
+<file path=customXml/itemProps1.xml><?xml version="1.0" encoding="utf-8"?>
 <ds:datastoreItem xmlns:ds="http://schemas.openxmlformats.org/officeDocument/2006/customXml" ds:itemID="{B60E032F-2E55-4A86-BB2D-1A317C642990}">
   <ds:schemaRefs>
     <ds:schemaRef ds:uri="http://schemas.microsoft.com/office/2006/metadata/contentType"/>
@@ -11380,4 +11440,22 @@
     <ds:schemaRef ds:uri="http://schemas.microsoft.com/internal/obd"/>
   </ds:schemaRefs>
 </ds:datastoreItem>
+</file>
+
+<file path=customXml/itemProps2.xml><?xml version="1.0" encoding="utf-8"?>
+<ds:datastoreItem xmlns:ds="http://schemas.openxmlformats.org/officeDocument/2006/customXml" ds:itemID="{C77EC923-6023-4411-8330-A0042153EED3}">
+  <ds:schemaRefs>
+    <ds:schemaRef ds:uri="http://schemas.microsoft.com/sharepoint/v3/contenttype/forms"/>
+  </ds:schemaRefs>
+</ds:datastoreItem>
+</file>
+
+<file path=customXml/itemProps3.xml><?xml version="1.0" encoding="utf-8"?>
+<ds:datastoreItem xmlns:ds="http://schemas.openxmlformats.org/officeDocument/2006/customXml" ds:itemID="{6DB4AFBF-E012-4607-B95C-D9E661912AC6}">
+  <ds:schemaRefs>
+    <ds:schemaRef ds:uri="http://schemas.microsoft.com/office/2006/metadata/properties"/>
+    <ds:schemaRef ds:uri="http://schemas.microsoft.com/office/infopath/2007/PartnerControls"/>
+    <ds:schemaRef ds:uri="71af3243-3dd4-4a8d-8c0d-dd76da1f02a5"/>
+  </ds:schemaRefs>
+</ds:datastoreItem>
 </file>
</xml_diff>